<commit_message>
added chart to poster
</commit_message>
<xml_diff>
--- a/Poster.pptx
+++ b/Poster.pptx
@@ -8831,7 +8831,7 @@
           </a:p>
           <a:p>
             <a:r>
-              <a:rPr lang="en-US" sz="2800" b="0" i="0" dirty="0">
+              <a:rPr lang="en-US" sz="2800" b="1" i="0" dirty="0">
                 <a:solidFill>
                   <a:srgbClr val="050505"/>
                 </a:solidFill>
@@ -8840,7 +8840,7 @@
               </a:rPr>
               <a:t>Our goal in this competition is to create a model that predicts the water quality in Estonian water stations with 90% accuracy.</a:t>
             </a:r>
-            <a:endParaRPr lang="en-US" sz="2800" dirty="0">
+            <a:endParaRPr lang="en-US" sz="2800" b="1" dirty="0">
               <a:latin typeface="Titillium Web" panose="00000500000000000000" pitchFamily="2" charset="0"/>
               <a:ea typeface="Open Sans" panose="020B0606030504020204" pitchFamily="34" charset="0"/>
               <a:cs typeface="Open Sans" panose="020B0606030504020204" pitchFamily="34" charset="0"/>
@@ -11811,8 +11811,8 @@
         </p:nvSpPr>
         <p:spPr bwMode="auto">
           <a:xfrm>
-            <a:off x="11961526" y="23655745"/>
-            <a:ext cx="8255867" cy="7032694"/>
+            <a:off x="11961526" y="24347729"/>
+            <a:ext cx="8255867" cy="6601807"/>
           </a:xfrm>
           <a:prstGeom prst="rect">
             <a:avLst/>
@@ -11957,7 +11957,7 @@
           </a:lstStyle>
           <a:p>
             <a:r>
-              <a:rPr lang="en-US" sz="2800" b="0" i="0" dirty="0">
+              <a:rPr lang="en-US" sz="2800" b="1" i="0" dirty="0">
                 <a:effectLst/>
                 <a:latin typeface="Segoe UI Historic" panose="020B0502040204020203" pitchFamily="34" charset="0"/>
                 <a:ea typeface="Segoe UI Historic" panose="020B0502040204020203" pitchFamily="34" charset="0"/>
@@ -11966,7 +11966,7 @@
               <a:t>We did not </a:t>
             </a:r>
             <a:r>
-              <a:rPr lang="en-US" sz="2800" b="0" i="0" dirty="0" err="1">
+              <a:rPr lang="en-US" sz="2800" b="1" i="0" dirty="0" err="1">
                 <a:effectLst/>
                 <a:latin typeface="Segoe UI Historic" panose="020B0502040204020203" pitchFamily="34" charset="0"/>
                 <a:ea typeface="Segoe UI Historic" panose="020B0502040204020203" pitchFamily="34" charset="0"/>
@@ -11975,7 +11975,7 @@
               <a:t>achi</a:t>
             </a:r>
             <a:r>
-              <a:rPr lang="et-EE" sz="2800" b="0" i="0" dirty="0">
+              <a:rPr lang="et-EE" sz="2800" b="1" i="0" dirty="0">
                 <a:effectLst/>
                 <a:latin typeface="Segoe UI Historic" panose="020B0502040204020203" pitchFamily="34" charset="0"/>
                 <a:ea typeface="Segoe UI Historic" panose="020B0502040204020203" pitchFamily="34" charset="0"/>
@@ -11984,7 +11984,7 @@
               <a:t>e</a:t>
             </a:r>
             <a:r>
-              <a:rPr lang="en-US" sz="2800" b="0" i="0" dirty="0" err="1">
+              <a:rPr lang="en-US" sz="2800" b="1" i="0" dirty="0" err="1">
                 <a:effectLst/>
                 <a:latin typeface="Segoe UI Historic" panose="020B0502040204020203" pitchFamily="34" charset="0"/>
                 <a:ea typeface="Segoe UI Historic" panose="020B0502040204020203" pitchFamily="34" charset="0"/>
@@ -11993,7 +11993,7 @@
               <a:t>ve</a:t>
             </a:r>
             <a:r>
-              <a:rPr lang="en-US" sz="2800" b="0" i="0" dirty="0">
+              <a:rPr lang="en-US" sz="2800" b="1" i="0" dirty="0">
                 <a:effectLst/>
                 <a:latin typeface="Segoe UI Historic" panose="020B0502040204020203" pitchFamily="34" charset="0"/>
                 <a:ea typeface="Segoe UI Historic" panose="020B0502040204020203" pitchFamily="34" charset="0"/>
@@ -12002,7 +12002,7 @@
               <a:t> our goal, as it was harder than expected,</a:t>
             </a:r>
             <a:r>
-              <a:rPr lang="et-EE" sz="2800" b="0" i="0" dirty="0">
+              <a:rPr lang="et-EE" sz="2800" b="1" i="0" dirty="0">
                 <a:effectLst/>
                 <a:latin typeface="Segoe UI Historic" panose="020B0502040204020203" pitchFamily="34" charset="0"/>
                 <a:ea typeface="Segoe UI Historic" panose="020B0502040204020203" pitchFamily="34" charset="0"/>
@@ -12011,7 +12011,7 @@
               <a:t> </a:t>
             </a:r>
             <a:r>
-              <a:rPr lang="et-EE" sz="2800" b="0" i="0" dirty="0" err="1">
+              <a:rPr lang="et-EE" sz="2800" b="1" i="0" dirty="0" err="1">
                 <a:effectLst/>
                 <a:latin typeface="Segoe UI Historic" panose="020B0502040204020203" pitchFamily="34" charset="0"/>
                 <a:ea typeface="Segoe UI Historic" panose="020B0502040204020203" pitchFamily="34" charset="0"/>
@@ -12020,7 +12020,7 @@
               <a:t>especially</a:t>
             </a:r>
             <a:r>
-              <a:rPr lang="et-EE" sz="2800" b="0" i="0" dirty="0">
+              <a:rPr lang="et-EE" sz="2800" b="1" i="0" dirty="0">
                 <a:effectLst/>
                 <a:latin typeface="Segoe UI Historic" panose="020B0502040204020203" pitchFamily="34" charset="0"/>
                 <a:ea typeface="Segoe UI Historic" panose="020B0502040204020203" pitchFamily="34" charset="0"/>
@@ -12029,7 +12029,7 @@
               <a:t> </a:t>
             </a:r>
             <a:r>
-              <a:rPr lang="et-EE" sz="2800" b="0" i="0" dirty="0" err="1">
+              <a:rPr lang="et-EE" sz="2800" b="1" i="0" dirty="0" err="1">
                 <a:effectLst/>
                 <a:latin typeface="Segoe UI Historic" panose="020B0502040204020203" pitchFamily="34" charset="0"/>
                 <a:ea typeface="Segoe UI Historic" panose="020B0502040204020203" pitchFamily="34" charset="0"/>
@@ -12038,7 +12038,7 @@
               <a:t>with</a:t>
             </a:r>
             <a:r>
-              <a:rPr lang="et-EE" sz="2800" b="0" i="0" dirty="0">
+              <a:rPr lang="et-EE" sz="2800" b="1" i="0" dirty="0">
                 <a:effectLst/>
                 <a:latin typeface="Segoe UI Historic" panose="020B0502040204020203" pitchFamily="34" charset="0"/>
                 <a:ea typeface="Segoe UI Historic" panose="020B0502040204020203" pitchFamily="34" charset="0"/>
@@ -12047,7 +12047,7 @@
               <a:t> </a:t>
             </a:r>
             <a:r>
-              <a:rPr lang="et-EE" sz="2800" b="0" i="0" dirty="0" err="1">
+              <a:rPr lang="et-EE" sz="2800" b="1" i="0" dirty="0" err="1">
                 <a:effectLst/>
                 <a:latin typeface="Segoe UI Historic" panose="020B0502040204020203" pitchFamily="34" charset="0"/>
                 <a:ea typeface="Segoe UI Historic" panose="020B0502040204020203" pitchFamily="34" charset="0"/>
@@ -12056,7 +12056,7 @@
               <a:t>the</a:t>
             </a:r>
             <a:r>
-              <a:rPr lang="et-EE" sz="2800" b="0" i="0" dirty="0">
+              <a:rPr lang="et-EE" sz="2800" b="1" i="0" dirty="0">
                 <a:effectLst/>
                 <a:latin typeface="Segoe UI Historic" panose="020B0502040204020203" pitchFamily="34" charset="0"/>
                 <a:ea typeface="Segoe UI Historic" panose="020B0502040204020203" pitchFamily="34" charset="0"/>
@@ -12065,7 +12065,7 @@
               <a:t> </a:t>
             </a:r>
             <a:r>
-              <a:rPr lang="et-EE" sz="2800" b="0" i="0" dirty="0" err="1">
+              <a:rPr lang="et-EE" sz="2800" b="1" i="0" dirty="0" err="1">
                 <a:effectLst/>
                 <a:latin typeface="Segoe UI Historic" panose="020B0502040204020203" pitchFamily="34" charset="0"/>
                 <a:ea typeface="Segoe UI Historic" panose="020B0502040204020203" pitchFamily="34" charset="0"/>
@@ -12074,7 +12074,7 @@
               <a:t>data</a:t>
             </a:r>
             <a:r>
-              <a:rPr lang="et-EE" sz="2800" b="0" i="0" dirty="0">
+              <a:rPr lang="et-EE" sz="2800" b="1" i="0" dirty="0">
                 <a:effectLst/>
                 <a:latin typeface="Segoe UI Historic" panose="020B0502040204020203" pitchFamily="34" charset="0"/>
                 <a:ea typeface="Segoe UI Historic" panose="020B0502040204020203" pitchFamily="34" charset="0"/>
@@ -12083,7 +12083,7 @@
               <a:t> </a:t>
             </a:r>
             <a:r>
-              <a:rPr lang="et-EE" sz="2800" b="0" i="0" dirty="0" err="1">
+              <a:rPr lang="et-EE" sz="2800" b="1" i="0" dirty="0" err="1">
                 <a:effectLst/>
                 <a:latin typeface="Segoe UI Historic" panose="020B0502040204020203" pitchFamily="34" charset="0"/>
                 <a:ea typeface="Segoe UI Historic" panose="020B0502040204020203" pitchFamily="34" charset="0"/>
@@ -12092,7 +12092,7 @@
               <a:t>given</a:t>
             </a:r>
             <a:r>
-              <a:rPr lang="et-EE" sz="2800" b="0" i="0" dirty="0">
+              <a:rPr lang="et-EE" sz="2800" b="1" i="0" dirty="0">
                 <a:effectLst/>
                 <a:latin typeface="Segoe UI Historic" panose="020B0502040204020203" pitchFamily="34" charset="0"/>
                 <a:ea typeface="Segoe UI Historic" panose="020B0502040204020203" pitchFamily="34" charset="0"/>
@@ -12101,7 +12101,7 @@
               <a:t>,</a:t>
             </a:r>
             <a:r>
-              <a:rPr lang="en-US" sz="2800" b="0" i="0" dirty="0">
+              <a:rPr lang="en-US" sz="2800" b="1" i="0" dirty="0">
                 <a:effectLst/>
                 <a:latin typeface="Segoe UI Historic" panose="020B0502040204020203" pitchFamily="34" charset="0"/>
                 <a:ea typeface="Segoe UI Historic" panose="020B0502040204020203" pitchFamily="34" charset="0"/>
@@ -12109,6 +12109,8 @@
               </a:rPr>
               <a:t> but we still managed to win the Kaggle competition.</a:t>
             </a:r>
+          </a:p>
+          <a:p>
             <a:br>
               <a:rPr lang="en-US" sz="2800" dirty="0">
                 <a:latin typeface="Segoe UI Historic" panose="020B0502040204020203" pitchFamily="34" charset="0"/>
@@ -12178,13 +12180,6 @@
             </a:endParaRPr>
           </a:p>
           <a:p>
-            <a:endParaRPr lang="en-US" sz="2800" dirty="0">
-              <a:latin typeface="Segoe UI Historic" panose="020B0502040204020203" pitchFamily="34" charset="0"/>
-              <a:ea typeface="Segoe UI Historic" panose="020B0502040204020203" pitchFamily="34" charset="0"/>
-              <a:cs typeface="Segoe UI Historic" panose="020B0502040204020203" pitchFamily="34" charset="0"/>
-            </a:endParaRPr>
-          </a:p>
-          <a:p>
             <a:br>
               <a:rPr lang="en-US" sz="2800" dirty="0">
                 <a:latin typeface="Segoe UI Historic" panose="020B0502040204020203" pitchFamily="34" charset="0"/>
@@ -12219,13 +12214,6 @@
               </a:rPr>
               <a:t>% accuracy.</a:t>
             </a:r>
-          </a:p>
-          <a:p>
-            <a:endParaRPr lang="en-US" sz="2800" dirty="0">
-              <a:latin typeface="Segoe UI Historic" panose="020B0502040204020203" pitchFamily="34" charset="0"/>
-              <a:ea typeface="Segoe UI Historic" panose="020B0502040204020203" pitchFamily="34" charset="0"/>
-              <a:cs typeface="Segoe UI Historic" panose="020B0502040204020203" pitchFamily="34" charset="0"/>
-            </a:endParaRPr>
           </a:p>
           <a:p>
             <a:br>
@@ -12284,7 +12272,7 @@
         <p:spPr>
           <a:xfrm>
             <a:off x="33384573" y="8656761"/>
-            <a:ext cx="9601200" cy="4832092"/>
+            <a:ext cx="9601200" cy="4401205"/>
           </a:xfrm>
           <a:prstGeom prst="rect">
             <a:avLst/>
@@ -12709,175 +12697,7 @@
                 <a:ea typeface="Open Sans" panose="020B0606030504020204" pitchFamily="34" charset="0"/>
                 <a:cs typeface="Open Sans" panose="020B0606030504020204" pitchFamily="34" charset="0"/>
               </a:rPr>
-              <a:t>, </a:t>
-            </a:r>
-            <a:r>
-              <a:rPr lang="et-EE" sz="2800" b="1" dirty="0" err="1">
-                <a:latin typeface="Titillium Web" panose="00000500000000000000" pitchFamily="2" charset="0"/>
-                <a:ea typeface="Open Sans" panose="020B0606030504020204" pitchFamily="34" charset="0"/>
-                <a:cs typeface="Open Sans" panose="020B0606030504020204" pitchFamily="34" charset="0"/>
-              </a:rPr>
-              <a:t>more</a:t>
-            </a:r>
-            <a:r>
-              <a:rPr lang="et-EE" sz="2800" b="1" dirty="0">
-                <a:latin typeface="Titillium Web" panose="00000500000000000000" pitchFamily="2" charset="0"/>
-                <a:ea typeface="Open Sans" panose="020B0606030504020204" pitchFamily="34" charset="0"/>
-                <a:cs typeface="Open Sans" panose="020B0606030504020204" pitchFamily="34" charset="0"/>
-              </a:rPr>
-              <a:t> </a:t>
-            </a:r>
-            <a:r>
-              <a:rPr lang="et-EE" sz="2800" b="1" dirty="0" err="1">
-                <a:latin typeface="Titillium Web" panose="00000500000000000000" pitchFamily="2" charset="0"/>
-                <a:ea typeface="Open Sans" panose="020B0606030504020204" pitchFamily="34" charset="0"/>
-                <a:cs typeface="Open Sans" panose="020B0606030504020204" pitchFamily="34" charset="0"/>
-              </a:rPr>
-              <a:t>contributement</a:t>
-            </a:r>
-            <a:r>
-              <a:rPr lang="et-EE" sz="2800" b="1" dirty="0">
-                <a:latin typeface="Titillium Web" panose="00000500000000000000" pitchFamily="2" charset="0"/>
-                <a:ea typeface="Open Sans" panose="020B0606030504020204" pitchFamily="34" charset="0"/>
-                <a:cs typeface="Open Sans" panose="020B0606030504020204" pitchFamily="34" charset="0"/>
-              </a:rPr>
-              <a:t> </a:t>
-            </a:r>
-            <a:r>
-              <a:rPr lang="et-EE" sz="2800" b="1" dirty="0" err="1">
-                <a:latin typeface="Titillium Web" panose="00000500000000000000" pitchFamily="2" charset="0"/>
-                <a:ea typeface="Open Sans" panose="020B0606030504020204" pitchFamily="34" charset="0"/>
-                <a:cs typeface="Open Sans" panose="020B0606030504020204" pitchFamily="34" charset="0"/>
-              </a:rPr>
-              <a:t>from</a:t>
-            </a:r>
-            <a:r>
-              <a:rPr lang="et-EE" sz="2800" b="1" dirty="0">
-                <a:latin typeface="Titillium Web" panose="00000500000000000000" pitchFamily="2" charset="0"/>
-                <a:ea typeface="Open Sans" panose="020B0606030504020204" pitchFamily="34" charset="0"/>
-                <a:cs typeface="Open Sans" panose="020B0606030504020204" pitchFamily="34" charset="0"/>
-              </a:rPr>
-              <a:t> </a:t>
-            </a:r>
-            <a:r>
-              <a:rPr lang="et-EE" sz="2800" b="1" dirty="0" err="1">
-                <a:latin typeface="Titillium Web" panose="00000500000000000000" pitchFamily="2" charset="0"/>
-                <a:ea typeface="Open Sans" panose="020B0606030504020204" pitchFamily="34" charset="0"/>
-                <a:cs typeface="Open Sans" panose="020B0606030504020204" pitchFamily="34" charset="0"/>
-              </a:rPr>
-              <a:t>certain</a:t>
-            </a:r>
-            <a:r>
-              <a:rPr lang="et-EE" sz="2800" b="1" dirty="0">
-                <a:latin typeface="Titillium Web" panose="00000500000000000000" pitchFamily="2" charset="0"/>
-                <a:ea typeface="Open Sans" panose="020B0606030504020204" pitchFamily="34" charset="0"/>
-                <a:cs typeface="Open Sans" panose="020B0606030504020204" pitchFamily="34" charset="0"/>
-              </a:rPr>
-              <a:t> </a:t>
-            </a:r>
-            <a:r>
-              <a:rPr lang="et-EE" sz="2800" b="1" dirty="0" err="1">
-                <a:latin typeface="Titillium Web" panose="00000500000000000000" pitchFamily="2" charset="0"/>
-                <a:ea typeface="Open Sans" panose="020B0606030504020204" pitchFamily="34" charset="0"/>
-                <a:cs typeface="Open Sans" panose="020B0606030504020204" pitchFamily="34" charset="0"/>
-              </a:rPr>
-              <a:t>team</a:t>
-            </a:r>
-            <a:r>
-              <a:rPr lang="et-EE" sz="2800" b="1" dirty="0">
-                <a:latin typeface="Titillium Web" panose="00000500000000000000" pitchFamily="2" charset="0"/>
-                <a:ea typeface="Open Sans" panose="020B0606030504020204" pitchFamily="34" charset="0"/>
-                <a:cs typeface="Open Sans" panose="020B0606030504020204" pitchFamily="34" charset="0"/>
-              </a:rPr>
-              <a:t> </a:t>
-            </a:r>
-            <a:r>
-              <a:rPr lang="et-EE" sz="2800" b="1" dirty="0" err="1">
-                <a:latin typeface="Titillium Web" panose="00000500000000000000" pitchFamily="2" charset="0"/>
-                <a:ea typeface="Open Sans" panose="020B0606030504020204" pitchFamily="34" charset="0"/>
-                <a:cs typeface="Open Sans" panose="020B0606030504020204" pitchFamily="34" charset="0"/>
-              </a:rPr>
-              <a:t>members</a:t>
-            </a:r>
-            <a:r>
-              <a:rPr lang="et-EE" sz="2800" b="1" dirty="0">
-                <a:latin typeface="Titillium Web" panose="00000500000000000000" pitchFamily="2" charset="0"/>
-                <a:ea typeface="Open Sans" panose="020B0606030504020204" pitchFamily="34" charset="0"/>
-                <a:cs typeface="Open Sans" panose="020B0606030504020204" pitchFamily="34" charset="0"/>
-              </a:rPr>
-              <a:t> </a:t>
-            </a:r>
-            <a:r>
-              <a:rPr lang="et-EE" sz="2800" b="1" dirty="0" err="1">
-                <a:latin typeface="Titillium Web" panose="00000500000000000000" pitchFamily="2" charset="0"/>
-                <a:ea typeface="Open Sans" panose="020B0606030504020204" pitchFamily="34" charset="0"/>
-                <a:cs typeface="Open Sans" panose="020B0606030504020204" pitchFamily="34" charset="0"/>
-              </a:rPr>
-              <a:t>starting</a:t>
-            </a:r>
-            <a:r>
-              <a:rPr lang="et-EE" sz="2800" b="1" dirty="0">
-                <a:latin typeface="Titillium Web" panose="00000500000000000000" pitchFamily="2" charset="0"/>
-                <a:ea typeface="Open Sans" panose="020B0606030504020204" pitchFamily="34" charset="0"/>
-                <a:cs typeface="Open Sans" panose="020B0606030504020204" pitchFamily="34" charset="0"/>
-              </a:rPr>
-              <a:t> </a:t>
-            </a:r>
-            <a:r>
-              <a:rPr lang="et-EE" sz="2800" b="1" dirty="0" err="1">
-                <a:latin typeface="Titillium Web" panose="00000500000000000000" pitchFamily="2" charset="0"/>
-                <a:ea typeface="Open Sans" panose="020B0606030504020204" pitchFamily="34" charset="0"/>
-                <a:cs typeface="Open Sans" panose="020B0606030504020204" pitchFamily="34" charset="0"/>
-              </a:rPr>
-              <a:t>with</a:t>
-            </a:r>
-            <a:r>
-              <a:rPr lang="et-EE" sz="2800" b="1" dirty="0">
-                <a:latin typeface="Titillium Web" panose="00000500000000000000" pitchFamily="2" charset="0"/>
-                <a:ea typeface="Open Sans" panose="020B0606030504020204" pitchFamily="34" charset="0"/>
-                <a:cs typeface="Open Sans" panose="020B0606030504020204" pitchFamily="34" charset="0"/>
-              </a:rPr>
-              <a:t> </a:t>
-            </a:r>
-            <a:r>
-              <a:rPr lang="et-EE" sz="2800" b="1" dirty="0" err="1">
-                <a:latin typeface="Titillium Web" panose="00000500000000000000" pitchFamily="2" charset="0"/>
-                <a:ea typeface="Open Sans" panose="020B0606030504020204" pitchFamily="34" charset="0"/>
-                <a:cs typeface="Open Sans" panose="020B0606030504020204" pitchFamily="34" charset="0"/>
-              </a:rPr>
-              <a:t>the</a:t>
-            </a:r>
-            <a:r>
-              <a:rPr lang="et-EE" sz="2800" b="1" dirty="0">
-                <a:latin typeface="Titillium Web" panose="00000500000000000000" pitchFamily="2" charset="0"/>
-                <a:ea typeface="Open Sans" panose="020B0606030504020204" pitchFamily="34" charset="0"/>
-                <a:cs typeface="Open Sans" panose="020B0606030504020204" pitchFamily="34" charset="0"/>
-              </a:rPr>
-              <a:t> </a:t>
-            </a:r>
-            <a:r>
-              <a:rPr lang="et-EE" sz="2800" b="1" dirty="0" err="1">
-                <a:latin typeface="Titillium Web" panose="00000500000000000000" pitchFamily="2" charset="0"/>
-                <a:ea typeface="Open Sans" panose="020B0606030504020204" pitchFamily="34" charset="0"/>
-                <a:cs typeface="Open Sans" panose="020B0606030504020204" pitchFamily="34" charset="0"/>
-              </a:rPr>
-              <a:t>letter</a:t>
-            </a:r>
-            <a:r>
-              <a:rPr lang="et-EE" sz="2800" b="1" dirty="0">
-                <a:latin typeface="Titillium Web" panose="00000500000000000000" pitchFamily="2" charset="0"/>
-                <a:ea typeface="Open Sans" panose="020B0606030504020204" pitchFamily="34" charset="0"/>
-                <a:cs typeface="Open Sans" panose="020B0606030504020204" pitchFamily="34" charset="0"/>
-              </a:rPr>
-              <a:t> H </a:t>
-            </a:r>
-            <a:r>
-              <a:rPr lang="et-EE" sz="2800" dirty="0">
-                <a:latin typeface="Titillium Web" panose="00000500000000000000" pitchFamily="2" charset="0"/>
-                <a:ea typeface="Open Sans" panose="020B0606030504020204" pitchFamily="34" charset="0"/>
-                <a:cs typeface="Open Sans" panose="020B0606030504020204" pitchFamily="34" charset="0"/>
-              </a:rPr>
-              <a:t>and </a:t>
+              <a:t>, and </a:t>
             </a:r>
             <a:r>
               <a:rPr lang="et-EE" sz="2800" dirty="0" err="1">
@@ -13528,42 +13348,6 @@
           </a:prstGeom>
         </p:spPr>
       </p:pic>
-      <p:pic>
-        <p:nvPicPr>
-          <p:cNvPr id="9" name="Picture 8" descr="Diagram&#10;&#10;Description automatically generated with medium confidence">
-            <a:extLst>
-              <a:ext uri="{FF2B5EF4-FFF2-40B4-BE49-F238E27FC236}">
-                <a16:creationId xmlns:a16="http://schemas.microsoft.com/office/drawing/2014/main" id="{0249406E-0052-77BA-E532-60624616678A}"/>
-              </a:ext>
-            </a:extLst>
-          </p:cNvPr>
-          <p:cNvPicPr>
-            <a:picLocks noChangeAspect="1"/>
-          </p:cNvPicPr>
-          <p:nvPr/>
-        </p:nvPicPr>
-        <p:blipFill>
-          <a:blip r:embed="rId8">
-            <a:extLst>
-              <a:ext uri="{28A0092B-C50C-407E-A947-70E740481C1C}">
-                <a14:useLocalDpi xmlns:a14="http://schemas.microsoft.com/office/drawing/2010/main" val="0"/>
-              </a:ext>
-            </a:extLst>
-          </a:blip>
-          <a:stretch>
-            <a:fillRect/>
-          </a:stretch>
-        </p:blipFill>
-        <p:spPr>
-          <a:xfrm>
-            <a:off x="22326600" y="9520069"/>
-            <a:ext cx="9615875" cy="2954537"/>
-          </a:xfrm>
-          <a:prstGeom prst="rect">
-            <a:avLst/>
-          </a:prstGeom>
-        </p:spPr>
-      </p:pic>
       <p:sp>
         <p:nvSpPr>
           <p:cNvPr id="10" name="TextBox 9">
@@ -13578,7 +13362,7 @@
         </p:nvSpPr>
         <p:spPr>
           <a:xfrm>
-            <a:off x="22326600" y="12388056"/>
+            <a:off x="29184600" y="18609258"/>
             <a:ext cx="1828800" cy="461665"/>
           </a:xfrm>
           <a:prstGeom prst="rect">
@@ -13678,7 +13462,7 @@
           <p:nvPr/>
         </p:nvPicPr>
         <p:blipFill>
-          <a:blip r:embed="rId9">
+          <a:blip r:embed="rId8">
             <a:extLst>
               <a:ext uri="{28A0092B-C50C-407E-A947-70E740481C1C}">
                 <a14:useLocalDpi xmlns:a14="http://schemas.microsoft.com/office/drawing/2010/main" val="0"/>
@@ -13715,6 +13499,188 @@
           <a:xfrm>
             <a:off x="11804732" y="15827400"/>
             <a:ext cx="10140868" cy="2622548"/>
+          </a:xfrm>
+          <a:prstGeom prst="roundRect">
+            <a:avLst/>
+          </a:prstGeom>
+          <a:noFill/>
+          <a:ln w="57150" cap="flat" cmpd="sng" algn="ctr">
+            <a:solidFill>
+              <a:schemeClr val="accent6">
+                <a:lumMod val="60000"/>
+                <a:lumOff val="40000"/>
+              </a:schemeClr>
+            </a:solidFill>
+            <a:prstDash val="solid"/>
+            <a:round/>
+            <a:headEnd type="none" w="med" len="med"/>
+            <a:tailEnd type="none" w="med" len="med"/>
+          </a:ln>
+          <a:effectLst/>
+          <a:extLst/>
+        </p:spPr>
+        <p:txBody>
+          <a:bodyPr vert="horz" wrap="square" lIns="91440" tIns="45720" rIns="91440" bIns="45720" numCol="1" rtlCol="0" anchor="t" anchorCtr="0" compatLnSpc="1">
+            <a:prstTxWarp prst="textNoShape">
+              <a:avLst/>
+            </a:prstTxWarp>
+          </a:bodyPr>
+          <a:lstStyle/>
+          <a:p>
+            <a:pPr marL="0" marR="0" indent="0" algn="l" defTabSz="4703763" rtl="0" eaLnBrk="1" fontAlgn="base" latinLnBrk="0" hangingPunct="1">
+              <a:lnSpc>
+                <a:spcPct val="100000"/>
+              </a:lnSpc>
+              <a:spcBef>
+                <a:spcPct val="0"/>
+              </a:spcBef>
+              <a:spcAft>
+                <a:spcPct val="0"/>
+              </a:spcAft>
+              <a:buClrTx/>
+              <a:buSzTx/>
+              <a:buFontTx/>
+              <a:buNone/>
+              <a:tabLst/>
+            </a:pPr>
+            <a:endParaRPr kumimoji="0" lang="en-US" sz="3800" b="0" i="0" u="none" strike="noStrike" cap="none" normalizeH="0" baseline="0">
+              <a:ln>
+                <a:noFill/>
+              </a:ln>
+              <a:solidFill>
+                <a:schemeClr val="tx1"/>
+              </a:solidFill>
+              <a:effectLst/>
+              <a:latin typeface="Arial" charset="0"/>
+            </a:endParaRPr>
+          </a:p>
+        </p:txBody>
+      </p:sp>
+      <p:pic>
+        <p:nvPicPr>
+          <p:cNvPr id="12" name="Picture 11">
+            <a:extLst>
+              <a:ext uri="{FF2B5EF4-FFF2-40B4-BE49-F238E27FC236}">
+                <a16:creationId xmlns:a16="http://schemas.microsoft.com/office/drawing/2014/main" id="{9F85D684-E3F2-4AAB-B9A2-24DAEF2C8AFD}"/>
+              </a:ext>
+            </a:extLst>
+          </p:cNvPr>
+          <p:cNvPicPr>
+            <a:picLocks noChangeAspect="1"/>
+          </p:cNvPicPr>
+          <p:nvPr/>
+        </p:nvPicPr>
+        <p:blipFill>
+          <a:blip r:embed="rId9">
+            <a:extLst>
+              <a:ext uri="{28A0092B-C50C-407E-A947-70E740481C1C}">
+                <a14:useLocalDpi xmlns:a14="http://schemas.microsoft.com/office/drawing/2010/main" val="0"/>
+              </a:ext>
+            </a:extLst>
+          </a:blip>
+          <a:stretch>
+            <a:fillRect/>
+          </a:stretch>
+        </p:blipFill>
+        <p:spPr>
+          <a:xfrm>
+            <a:off x="22475669" y="9529526"/>
+            <a:ext cx="9951519" cy="9079732"/>
+          </a:xfrm>
+          <a:prstGeom prst="rect">
+            <a:avLst/>
+          </a:prstGeom>
+        </p:spPr>
+      </p:pic>
+      <p:sp>
+        <p:nvSpPr>
+          <p:cNvPr id="34" name="Rectangle: Rounded Corners 33">
+            <a:extLst>
+              <a:ext uri="{FF2B5EF4-FFF2-40B4-BE49-F238E27FC236}">
+                <a16:creationId xmlns:a16="http://schemas.microsoft.com/office/drawing/2014/main" id="{E45EE1DD-2CA7-4B51-9EC9-039CA34D8029}"/>
+              </a:ext>
+            </a:extLst>
+          </p:cNvPr>
+          <p:cNvSpPr/>
+          <p:nvPr/>
+        </p:nvSpPr>
+        <p:spPr bwMode="auto">
+          <a:xfrm>
+            <a:off x="900512" y="15468600"/>
+            <a:ext cx="9081688" cy="1576497"/>
+          </a:xfrm>
+          <a:prstGeom prst="roundRect">
+            <a:avLst/>
+          </a:prstGeom>
+          <a:noFill/>
+          <a:ln w="57150" cap="flat" cmpd="sng" algn="ctr">
+            <a:solidFill>
+              <a:schemeClr val="accent6">
+                <a:lumMod val="60000"/>
+                <a:lumOff val="40000"/>
+              </a:schemeClr>
+            </a:solidFill>
+            <a:prstDash val="solid"/>
+            <a:round/>
+            <a:headEnd type="none" w="med" len="med"/>
+            <a:tailEnd type="none" w="med" len="med"/>
+          </a:ln>
+          <a:effectLst/>
+          <a:extLst/>
+        </p:spPr>
+        <p:txBody>
+          <a:bodyPr vert="horz" wrap="square" lIns="91440" tIns="45720" rIns="91440" bIns="45720" numCol="1" rtlCol="0" anchor="t" anchorCtr="0" compatLnSpc="1">
+            <a:prstTxWarp prst="textNoShape">
+              <a:avLst/>
+            </a:prstTxWarp>
+          </a:bodyPr>
+          <a:lstStyle/>
+          <a:p>
+            <a:pPr marL="0" marR="0" indent="0" algn="l" defTabSz="4703763" rtl="0" eaLnBrk="1" fontAlgn="base" latinLnBrk="0" hangingPunct="1">
+              <a:lnSpc>
+                <a:spcPct val="100000"/>
+              </a:lnSpc>
+              <a:spcBef>
+                <a:spcPct val="0"/>
+              </a:spcBef>
+              <a:spcAft>
+                <a:spcPct val="0"/>
+              </a:spcAft>
+              <a:buClrTx/>
+              <a:buSzTx/>
+              <a:buFontTx/>
+              <a:buNone/>
+              <a:tabLst/>
+            </a:pPr>
+            <a:endParaRPr kumimoji="0" lang="en-US" sz="3800" b="0" i="0" u="none" strike="noStrike" cap="none" normalizeH="0" baseline="0">
+              <a:ln>
+                <a:noFill/>
+              </a:ln>
+              <a:solidFill>
+                <a:schemeClr val="tx1"/>
+              </a:solidFill>
+              <a:effectLst/>
+              <a:latin typeface="Arial" charset="0"/>
+            </a:endParaRPr>
+          </a:p>
+        </p:txBody>
+      </p:sp>
+      <p:sp>
+        <p:nvSpPr>
+          <p:cNvPr id="35" name="Rectangle: Rounded Corners 34">
+            <a:extLst>
+              <a:ext uri="{FF2B5EF4-FFF2-40B4-BE49-F238E27FC236}">
+                <a16:creationId xmlns:a16="http://schemas.microsoft.com/office/drawing/2014/main" id="{C53B2A37-BFE8-4432-B762-9CB11116D205}"/>
+              </a:ext>
+            </a:extLst>
+          </p:cNvPr>
+          <p:cNvSpPr/>
+          <p:nvPr/>
+        </p:nvSpPr>
+        <p:spPr bwMode="auto">
+          <a:xfrm>
+            <a:off x="11804732" y="24030831"/>
+            <a:ext cx="8412661" cy="1952737"/>
           </a:xfrm>
           <a:prstGeom prst="roundRect">
             <a:avLst/>

</xml_diff>

<commit_message>
final changes to poster
</commit_message>
<xml_diff>
--- a/Poster.pptx
+++ b/Poster.pptx
@@ -21,19 +21,26 @@
       <p:boldItalic r:id="rId7"/>
     </p:embeddedFont>
     <p:embeddedFont>
-      <p:font typeface="Segoe UI Historic" panose="020B0502040204020203" pitchFamily="34" charset="0"/>
+      <p:font typeface="Open Sans" pitchFamily="2" charset="0"/>
       <p:regular r:id="rId8"/>
+      <p:bold r:id="rId9"/>
+      <p:italic r:id="rId10"/>
+      <p:boldItalic r:id="rId11"/>
     </p:embeddedFont>
     <p:embeddedFont>
-      <p:font typeface="Titillium Web" panose="00000500000000000000" pitchFamily="2" charset="-70"/>
-      <p:regular r:id="rId9"/>
-      <p:bold r:id="rId10"/>
-      <p:italic r:id="rId11"/>
-      <p:boldItalic r:id="rId12"/>
+      <p:font typeface="Segoe UI Historic" panose="020B0502040204020203" pitchFamily="34" charset="0"/>
+      <p:regular r:id="rId12"/>
+    </p:embeddedFont>
+    <p:embeddedFont>
+      <p:font typeface="Titillium Web" panose="020B0604020202020204" charset="0"/>
+      <p:regular r:id="rId13"/>
+      <p:bold r:id="rId14"/>
+      <p:italic r:id="rId15"/>
+      <p:boldItalic r:id="rId16"/>
     </p:embeddedFont>
   </p:embeddedFontLst>
   <p:custDataLst>
-    <p:tags r:id="rId13"/>
+    <p:tags r:id="rId17"/>
   </p:custDataLst>
   <p:defaultTextStyle>
     <a:defPPr>
@@ -12568,12 +12575,12 @@
               <a:t> </a:t>
             </a:r>
             <a:r>
-              <a:rPr lang="et-EE" sz="2800" dirty="0" err="1">
-                <a:latin typeface="Titillium Web" panose="00000500000000000000" pitchFamily="2" charset="0"/>
-                <a:ea typeface="Open Sans" panose="020B0606030504020204" pitchFamily="34" charset="0"/>
-                <a:cs typeface="Open Sans" panose="020B0606030504020204" pitchFamily="34" charset="0"/>
-              </a:rPr>
-              <a:t>things</a:t>
+              <a:rPr lang="en-US" sz="2800" dirty="0">
+                <a:latin typeface="Titillium Web" panose="00000500000000000000" pitchFamily="2" charset="0"/>
+                <a:ea typeface="Open Sans" panose="020B0606030504020204" pitchFamily="34" charset="0"/>
+                <a:cs typeface="Open Sans" panose="020B0606030504020204" pitchFamily="34" charset="0"/>
+              </a:rPr>
+              <a:t>methods</a:t>
             </a:r>
             <a:r>
               <a:rPr lang="et-EE" sz="2800" dirty="0">
@@ -13351,15 +13358,13 @@
               <a:t>values</a:t>
             </a:r>
             <a:r>
-              <a:rPr lang="et-EE" sz="2800" dirty="0">
-                <a:latin typeface="Titillium Web" panose="00000500000000000000" pitchFamily="2" charset="0"/>
-                <a:ea typeface="Open Sans" panose="020B0606030504020204" pitchFamily="34" charset="0"/>
-                <a:cs typeface="Open Sans" panose="020B0606030504020204" pitchFamily="34" charset="0"/>
-              </a:rPr>
-              <a:t>.</a:t>
-            </a:r>
-          </a:p>
-          <a:p>
+              <a:rPr lang="en-US" sz="2800" dirty="0">
+                <a:latin typeface="Titillium Web" panose="00000500000000000000" pitchFamily="2" charset="0"/>
+                <a:ea typeface="Open Sans" panose="020B0606030504020204" pitchFamily="34" charset="0"/>
+                <a:cs typeface="Open Sans" panose="020B0606030504020204" pitchFamily="34" charset="0"/>
+              </a:rPr>
+              <a:t> (more measurements done regularly)</a:t>
+            </a:r>
             <a:endParaRPr lang="et-EE" sz="2800" dirty="0">
               <a:latin typeface="Titillium Web" panose="00000500000000000000" pitchFamily="2" charset="0"/>
               <a:ea typeface="Open Sans" panose="020B0606030504020204" pitchFamily="34" charset="0"/>
@@ -13367,6 +13372,13 @@
             </a:endParaRPr>
           </a:p>
           <a:p>
+            <a:endParaRPr lang="et-EE" sz="2800" dirty="0">
+              <a:latin typeface="Titillium Web" panose="00000500000000000000" pitchFamily="2" charset="0"/>
+              <a:ea typeface="Open Sans" panose="020B0606030504020204" pitchFamily="34" charset="0"/>
+              <a:cs typeface="Open Sans" panose="020B0606030504020204" pitchFamily="34" charset="0"/>
+            </a:endParaRPr>
+          </a:p>
+          <a:p>
             <a:r>
               <a:rPr lang="et-EE" sz="2800" dirty="0" err="1">
                 <a:latin typeface="Titillium Web" panose="00000500000000000000" pitchFamily="2" charset="0"/>
@@ -13448,6 +13460,22 @@
               <a:t> </a:t>
             </a:r>
             <a:r>
+              <a:rPr lang="en-US" sz="2800" dirty="0" err="1">
+                <a:latin typeface="Titillium Web" panose="00000500000000000000" pitchFamily="2" charset="0"/>
+                <a:ea typeface="Open Sans" panose="020B0606030504020204" pitchFamily="34" charset="0"/>
+                <a:cs typeface="Open Sans" panose="020B0606030504020204" pitchFamily="34" charset="0"/>
+              </a:rPr>
+              <a:t>togheter</a:t>
+            </a:r>
+            <a:r>
+              <a:rPr lang="en-US" sz="2800" dirty="0">
+                <a:latin typeface="Titillium Web" panose="00000500000000000000" pitchFamily="2" charset="0"/>
+                <a:ea typeface="Open Sans" panose="020B0606030504020204" pitchFamily="34" charset="0"/>
+                <a:cs typeface="Open Sans" panose="020B0606030504020204" pitchFamily="34" charset="0"/>
+              </a:rPr>
+              <a:t> </a:t>
+            </a:r>
+            <a:r>
               <a:rPr lang="et-EE" sz="2800" dirty="0" err="1">
                 <a:latin typeface="Titillium Web" panose="00000500000000000000" pitchFamily="2" charset="0"/>
                 <a:ea typeface="Open Sans" panose="020B0606030504020204" pitchFamily="34" charset="0"/>
@@ -13621,250 +13649,16 @@
                 <a:ea typeface="Open Sans" panose="020B0606030504020204" pitchFamily="34" charset="0"/>
                 <a:cs typeface="Open Sans" panose="020B0606030504020204" pitchFamily="34" charset="0"/>
               </a:rPr>
-              <a:t>. </a:t>
-            </a:r>
-            <a:r>
-              <a:rPr lang="et-EE" sz="2800" dirty="0" err="1">
-                <a:latin typeface="Titillium Web" panose="00000500000000000000" pitchFamily="2" charset="0"/>
-                <a:ea typeface="Open Sans" panose="020B0606030504020204" pitchFamily="34" charset="0"/>
-                <a:cs typeface="Open Sans" panose="020B0606030504020204" pitchFamily="34" charset="0"/>
-              </a:rPr>
-              <a:t>When</a:t>
-            </a:r>
-            <a:r>
-              <a:rPr lang="et-EE" sz="2800" dirty="0">
-                <a:latin typeface="Titillium Web" panose="00000500000000000000" pitchFamily="2" charset="0"/>
-                <a:ea typeface="Open Sans" panose="020B0606030504020204" pitchFamily="34" charset="0"/>
-                <a:cs typeface="Open Sans" panose="020B0606030504020204" pitchFamily="34" charset="0"/>
-              </a:rPr>
-              <a:t> </a:t>
-            </a:r>
-            <a:r>
-              <a:rPr lang="et-EE" sz="2800" dirty="0" err="1">
-                <a:latin typeface="Titillium Web" panose="00000500000000000000" pitchFamily="2" charset="0"/>
-                <a:ea typeface="Open Sans" panose="020B0606030504020204" pitchFamily="34" charset="0"/>
-                <a:cs typeface="Open Sans" panose="020B0606030504020204" pitchFamily="34" charset="0"/>
-              </a:rPr>
-              <a:t>you</a:t>
-            </a:r>
-            <a:r>
-              <a:rPr lang="et-EE" sz="2800" dirty="0">
-                <a:latin typeface="Titillium Web" panose="00000500000000000000" pitchFamily="2" charset="0"/>
-                <a:ea typeface="Open Sans" panose="020B0606030504020204" pitchFamily="34" charset="0"/>
-                <a:cs typeface="Open Sans" panose="020B0606030504020204" pitchFamily="34" charset="0"/>
-              </a:rPr>
-              <a:t> </a:t>
-            </a:r>
-            <a:r>
-              <a:rPr lang="et-EE" sz="2800" dirty="0" err="1">
-                <a:latin typeface="Titillium Web" panose="00000500000000000000" pitchFamily="2" charset="0"/>
-                <a:ea typeface="Open Sans" panose="020B0606030504020204" pitchFamily="34" charset="0"/>
-                <a:cs typeface="Open Sans" panose="020B0606030504020204" pitchFamily="34" charset="0"/>
-              </a:rPr>
-              <a:t>know</a:t>
-            </a:r>
-            <a:r>
-              <a:rPr lang="et-EE" sz="2800" dirty="0">
-                <a:latin typeface="Titillium Web" panose="00000500000000000000" pitchFamily="2" charset="0"/>
-                <a:ea typeface="Open Sans" panose="020B0606030504020204" pitchFamily="34" charset="0"/>
-                <a:cs typeface="Open Sans" panose="020B0606030504020204" pitchFamily="34" charset="0"/>
-              </a:rPr>
-              <a:t> </a:t>
-            </a:r>
-            <a:r>
-              <a:rPr lang="et-EE" sz="2800" dirty="0" err="1">
-                <a:latin typeface="Titillium Web" panose="00000500000000000000" pitchFamily="2" charset="0"/>
-                <a:ea typeface="Open Sans" panose="020B0606030504020204" pitchFamily="34" charset="0"/>
-                <a:cs typeface="Open Sans" panose="020B0606030504020204" pitchFamily="34" charset="0"/>
-              </a:rPr>
-              <a:t>what</a:t>
-            </a:r>
-            <a:r>
-              <a:rPr lang="et-EE" sz="2800" dirty="0">
-                <a:latin typeface="Titillium Web" panose="00000500000000000000" pitchFamily="2" charset="0"/>
-                <a:ea typeface="Open Sans" panose="020B0606030504020204" pitchFamily="34" charset="0"/>
-                <a:cs typeface="Open Sans" panose="020B0606030504020204" pitchFamily="34" charset="0"/>
-              </a:rPr>
-              <a:t> are </a:t>
-            </a:r>
-            <a:r>
-              <a:rPr lang="et-EE" sz="2800" dirty="0" err="1">
-                <a:latin typeface="Titillium Web" panose="00000500000000000000" pitchFamily="2" charset="0"/>
-                <a:ea typeface="Open Sans" panose="020B0606030504020204" pitchFamily="34" charset="0"/>
-                <a:cs typeface="Open Sans" panose="020B0606030504020204" pitchFamily="34" charset="0"/>
-              </a:rPr>
-              <a:t>the</a:t>
-            </a:r>
-            <a:r>
-              <a:rPr lang="et-EE" sz="2800" dirty="0">
-                <a:latin typeface="Titillium Web" panose="00000500000000000000" pitchFamily="2" charset="0"/>
-                <a:ea typeface="Open Sans" panose="020B0606030504020204" pitchFamily="34" charset="0"/>
-                <a:cs typeface="Open Sans" panose="020B0606030504020204" pitchFamily="34" charset="0"/>
-              </a:rPr>
-              <a:t> </a:t>
-            </a:r>
-            <a:r>
-              <a:rPr lang="et-EE" sz="2800" dirty="0" err="1">
-                <a:latin typeface="Titillium Web" panose="00000500000000000000" pitchFamily="2" charset="0"/>
-                <a:ea typeface="Open Sans" panose="020B0606030504020204" pitchFamily="34" charset="0"/>
-                <a:cs typeface="Open Sans" panose="020B0606030504020204" pitchFamily="34" charset="0"/>
-              </a:rPr>
-              <a:t>critical</a:t>
-            </a:r>
-            <a:r>
-              <a:rPr lang="et-EE" sz="2800" dirty="0">
-                <a:latin typeface="Titillium Web" panose="00000500000000000000" pitchFamily="2" charset="0"/>
-                <a:ea typeface="Open Sans" panose="020B0606030504020204" pitchFamily="34" charset="0"/>
-                <a:cs typeface="Open Sans" panose="020B0606030504020204" pitchFamily="34" charset="0"/>
-              </a:rPr>
-              <a:t> </a:t>
-            </a:r>
-            <a:r>
-              <a:rPr lang="et-EE" sz="2800" dirty="0" err="1">
-                <a:latin typeface="Titillium Web" panose="00000500000000000000" pitchFamily="2" charset="0"/>
-                <a:ea typeface="Open Sans" panose="020B0606030504020204" pitchFamily="34" charset="0"/>
-                <a:cs typeface="Open Sans" panose="020B0606030504020204" pitchFamily="34" charset="0"/>
-              </a:rPr>
-              <a:t>attributes</a:t>
-            </a:r>
-            <a:r>
-              <a:rPr lang="et-EE" sz="2800" dirty="0">
-                <a:latin typeface="Titillium Web" panose="00000500000000000000" pitchFamily="2" charset="0"/>
-                <a:ea typeface="Open Sans" panose="020B0606030504020204" pitchFamily="34" charset="0"/>
-                <a:cs typeface="Open Sans" panose="020B0606030504020204" pitchFamily="34" charset="0"/>
-              </a:rPr>
-              <a:t> in </a:t>
-            </a:r>
-            <a:r>
-              <a:rPr lang="et-EE" sz="2800" dirty="0" err="1">
-                <a:latin typeface="Titillium Web" panose="00000500000000000000" pitchFamily="2" charset="0"/>
-                <a:ea typeface="Open Sans" panose="020B0606030504020204" pitchFamily="34" charset="0"/>
-                <a:cs typeface="Open Sans" panose="020B0606030504020204" pitchFamily="34" charset="0"/>
-              </a:rPr>
-              <a:t>water</a:t>
-            </a:r>
-            <a:r>
-              <a:rPr lang="et-EE" sz="2800" dirty="0">
-                <a:latin typeface="Titillium Web" panose="00000500000000000000" pitchFamily="2" charset="0"/>
-                <a:ea typeface="Open Sans" panose="020B0606030504020204" pitchFamily="34" charset="0"/>
-                <a:cs typeface="Open Sans" panose="020B0606030504020204" pitchFamily="34" charset="0"/>
-              </a:rPr>
-              <a:t> </a:t>
-            </a:r>
-            <a:r>
-              <a:rPr lang="et-EE" sz="2800" dirty="0" err="1">
-                <a:latin typeface="Titillium Web" panose="00000500000000000000" pitchFamily="2" charset="0"/>
-                <a:ea typeface="Open Sans" panose="020B0606030504020204" pitchFamily="34" charset="0"/>
-                <a:cs typeface="Open Sans" panose="020B0606030504020204" pitchFamily="34" charset="0"/>
-              </a:rPr>
-              <a:t>quality</a:t>
-            </a:r>
-            <a:r>
-              <a:rPr lang="et-EE" sz="2800" dirty="0">
-                <a:latin typeface="Titillium Web" panose="00000500000000000000" pitchFamily="2" charset="0"/>
-                <a:ea typeface="Open Sans" panose="020B0606030504020204" pitchFamily="34" charset="0"/>
-                <a:cs typeface="Open Sans" panose="020B0606030504020204" pitchFamily="34" charset="0"/>
-              </a:rPr>
-              <a:t>, </a:t>
-            </a:r>
-            <a:r>
-              <a:rPr lang="et-EE" sz="2800" dirty="0" err="1">
-                <a:latin typeface="Titillium Web" panose="00000500000000000000" pitchFamily="2" charset="0"/>
-                <a:ea typeface="Open Sans" panose="020B0606030504020204" pitchFamily="34" charset="0"/>
-                <a:cs typeface="Open Sans" panose="020B0606030504020204" pitchFamily="34" charset="0"/>
-              </a:rPr>
-              <a:t>it</a:t>
-            </a:r>
-            <a:r>
-              <a:rPr lang="et-EE" sz="2800" dirty="0">
-                <a:latin typeface="Titillium Web" panose="00000500000000000000" pitchFamily="2" charset="0"/>
-                <a:ea typeface="Open Sans" panose="020B0606030504020204" pitchFamily="34" charset="0"/>
-                <a:cs typeface="Open Sans" panose="020B0606030504020204" pitchFamily="34" charset="0"/>
-              </a:rPr>
-              <a:t> </a:t>
-            </a:r>
-            <a:r>
-              <a:rPr lang="et-EE" sz="2800" dirty="0" err="1">
-                <a:latin typeface="Titillium Web" panose="00000500000000000000" pitchFamily="2" charset="0"/>
-                <a:ea typeface="Open Sans" panose="020B0606030504020204" pitchFamily="34" charset="0"/>
-                <a:cs typeface="Open Sans" panose="020B0606030504020204" pitchFamily="34" charset="0"/>
-              </a:rPr>
-              <a:t>is</a:t>
-            </a:r>
-            <a:r>
-              <a:rPr lang="et-EE" sz="2800" dirty="0">
-                <a:latin typeface="Titillium Web" panose="00000500000000000000" pitchFamily="2" charset="0"/>
-                <a:ea typeface="Open Sans" panose="020B0606030504020204" pitchFamily="34" charset="0"/>
-                <a:cs typeface="Open Sans" panose="020B0606030504020204" pitchFamily="34" charset="0"/>
-              </a:rPr>
-              <a:t> </a:t>
-            </a:r>
-            <a:r>
-              <a:rPr lang="et-EE" sz="2800" dirty="0" err="1">
-                <a:latin typeface="Titillium Web" panose="00000500000000000000" pitchFamily="2" charset="0"/>
-                <a:ea typeface="Open Sans" panose="020B0606030504020204" pitchFamily="34" charset="0"/>
-                <a:cs typeface="Open Sans" panose="020B0606030504020204" pitchFamily="34" charset="0"/>
-              </a:rPr>
-              <a:t>easier</a:t>
-            </a:r>
-            <a:r>
-              <a:rPr lang="et-EE" sz="2800" dirty="0">
-                <a:latin typeface="Titillium Web" panose="00000500000000000000" pitchFamily="2" charset="0"/>
-                <a:ea typeface="Open Sans" panose="020B0606030504020204" pitchFamily="34" charset="0"/>
-                <a:cs typeface="Open Sans" panose="020B0606030504020204" pitchFamily="34" charset="0"/>
-              </a:rPr>
-              <a:t> </a:t>
-            </a:r>
-            <a:r>
-              <a:rPr lang="et-EE" sz="2800" dirty="0" err="1">
-                <a:latin typeface="Titillium Web" panose="00000500000000000000" pitchFamily="2" charset="0"/>
-                <a:ea typeface="Open Sans" panose="020B0606030504020204" pitchFamily="34" charset="0"/>
-                <a:cs typeface="Open Sans" panose="020B0606030504020204" pitchFamily="34" charset="0"/>
-              </a:rPr>
-              <a:t>to</a:t>
-            </a:r>
-            <a:r>
-              <a:rPr lang="et-EE" sz="2800" dirty="0">
-                <a:latin typeface="Titillium Web" panose="00000500000000000000" pitchFamily="2" charset="0"/>
-                <a:ea typeface="Open Sans" panose="020B0606030504020204" pitchFamily="34" charset="0"/>
-                <a:cs typeface="Open Sans" panose="020B0606030504020204" pitchFamily="34" charset="0"/>
-              </a:rPr>
-              <a:t> </a:t>
-            </a:r>
-            <a:r>
-              <a:rPr lang="et-EE" sz="2800" dirty="0" err="1">
-                <a:latin typeface="Titillium Web" panose="00000500000000000000" pitchFamily="2" charset="0"/>
-                <a:ea typeface="Open Sans" panose="020B0606030504020204" pitchFamily="34" charset="0"/>
-                <a:cs typeface="Open Sans" panose="020B0606030504020204" pitchFamily="34" charset="0"/>
-              </a:rPr>
-              <a:t>separate</a:t>
-            </a:r>
-            <a:r>
-              <a:rPr lang="et-EE" sz="2800" dirty="0">
-                <a:latin typeface="Titillium Web" panose="00000500000000000000" pitchFamily="2" charset="0"/>
-                <a:ea typeface="Open Sans" panose="020B0606030504020204" pitchFamily="34" charset="0"/>
-                <a:cs typeface="Open Sans" panose="020B0606030504020204" pitchFamily="34" charset="0"/>
-              </a:rPr>
-              <a:t> and </a:t>
-            </a:r>
-            <a:r>
-              <a:rPr lang="et-EE" sz="2800" dirty="0" err="1">
-                <a:latin typeface="Titillium Web" panose="00000500000000000000" pitchFamily="2" charset="0"/>
-                <a:ea typeface="Open Sans" panose="020B0606030504020204" pitchFamily="34" charset="0"/>
-                <a:cs typeface="Open Sans" panose="020B0606030504020204" pitchFamily="34" charset="0"/>
-              </a:rPr>
-              <a:t>predict</a:t>
-            </a:r>
-            <a:r>
-              <a:rPr lang="et-EE" sz="2800" dirty="0">
-                <a:latin typeface="Titillium Web" panose="00000500000000000000" pitchFamily="2" charset="0"/>
-                <a:ea typeface="Open Sans" panose="020B0606030504020204" pitchFamily="34" charset="0"/>
-                <a:cs typeface="Open Sans" panose="020B0606030504020204" pitchFamily="34" charset="0"/>
-              </a:rPr>
               <a:t>.</a:t>
             </a:r>
-          </a:p>
-          <a:p>
+            <a:r>
+              <a:rPr lang="en-US" sz="2800" dirty="0">
+                <a:latin typeface="Titillium Web" panose="00000500000000000000" pitchFamily="2" charset="0"/>
+                <a:ea typeface="Open Sans" panose="020B0606030504020204" pitchFamily="34" charset="0"/>
+                <a:cs typeface="Open Sans" panose="020B0606030504020204" pitchFamily="34" charset="0"/>
+              </a:rPr>
+              <a:t> With more data that spans multiple years, predictive models could be potentially used to aid water testing and monitoring personnel.</a:t>
+            </a:r>
             <a:endParaRPr lang="et-EE" sz="2800" dirty="0">
               <a:latin typeface="Titillium Web" panose="00000500000000000000" pitchFamily="2" charset="0"/>
               <a:ea typeface="Open Sans" panose="020B0606030504020204" pitchFamily="34" charset="0"/>
@@ -16431,13 +16225,18 @@
               <a:t>before</a:t>
             </a:r>
             <a:r>
-              <a:rPr lang="et-EE" sz="2400" dirty="0">
-                <a:latin typeface="Segoe UI Historic" panose="020B0502040204020203" pitchFamily="34" charset="0"/>
-                <a:ea typeface="Segoe UI Historic" panose="020B0502040204020203" pitchFamily="34" charset="0"/>
-                <a:cs typeface="Segoe UI Historic" panose="020B0502040204020203" pitchFamily="34" charset="0"/>
-              </a:rPr>
-              <a:t>.</a:t>
-            </a:r>
+              <a:rPr lang="en-US" sz="2400" dirty="0">
+                <a:latin typeface="Segoe UI Historic" panose="020B0502040204020203" pitchFamily="34" charset="0"/>
+                <a:ea typeface="Segoe UI Historic" panose="020B0502040204020203" pitchFamily="34" charset="0"/>
+                <a:cs typeface="Segoe UI Historic" panose="020B0502040204020203" pitchFamily="34" charset="0"/>
+              </a:rPr>
+              <a:t>, but rather a costume approach for this problem.</a:t>
+            </a:r>
+            <a:endParaRPr lang="et-EE" sz="2400" dirty="0">
+              <a:latin typeface="Segoe UI Historic" panose="020B0502040204020203" pitchFamily="34" charset="0"/>
+              <a:ea typeface="Segoe UI Historic" panose="020B0502040204020203" pitchFamily="34" charset="0"/>
+              <a:cs typeface="Segoe UI Historic" panose="020B0502040204020203" pitchFamily="34" charset="0"/>
+            </a:endParaRPr>
           </a:p>
           <a:p>
             <a:pPr marL="1371600" lvl="2" indent="-457200">
@@ -16562,8 +16361,8 @@
         </p:blipFill>
         <p:spPr bwMode="auto">
           <a:xfrm>
-            <a:off x="39785018" y="30797812"/>
-            <a:ext cx="3436728" cy="1323027"/>
+            <a:off x="37679543" y="29987274"/>
+            <a:ext cx="5542204" cy="2133566"/>
           </a:xfrm>
           <a:prstGeom prst="rect">
             <a:avLst/>

</xml_diff>